<commit_message>
Update Presentación - Interfaz Shell scripting - Juan Carlos Collado Custodio.pptx
</commit_message>
<xml_diff>
--- a/Presentación - Interfaz Shell scripting - Juan Carlos Collado Custodio.pptx
+++ b/Presentación - Interfaz Shell scripting - Juan Carlos Collado Custodio.pptx
@@ -13,6 +13,7 @@
     <p:sldId id="261" r:id="rId7"/>
     <p:sldId id="262" r:id="rId8"/>
     <p:sldId id="263" r:id="rId9"/>
+    <p:sldId id="264" r:id="rId10"/>
   </p:sldIdLst>
   <p:sldSz cx="12192000" cy="6858000"/>
   <p:notesSz cx="6858000" cy="9144000"/>
@@ -708,7 +709,7 @@
             <a:fld id="{B61BEF0D-F0BB-DE4B-95CE-6DB70DBA9567}" type="datetimeFigureOut">
               <a:rPr lang="en-US" dirty="0"/>
               <a:pPr/>
-              <a:t>12/1/2020</a:t>
+              <a:t>12/4/2020</a:t>
             </a:fld>
             <a:endParaRPr lang="en-US" dirty="0"/>
           </a:p>
@@ -1039,7 +1040,7 @@
             <a:fld id="{B61BEF0D-F0BB-DE4B-95CE-6DB70DBA9567}" type="datetimeFigureOut">
               <a:rPr lang="en-US" dirty="0"/>
               <a:pPr/>
-              <a:t>12/1/2020</a:t>
+              <a:t>12/4/2020</a:t>
             </a:fld>
             <a:endParaRPr lang="en-US" dirty="0"/>
           </a:p>
@@ -1314,7 +1315,7 @@
             <a:fld id="{B61BEF0D-F0BB-DE4B-95CE-6DB70DBA9567}" type="datetimeFigureOut">
               <a:rPr lang="en-US" dirty="0"/>
               <a:pPr/>
-              <a:t>12/1/2020</a:t>
+              <a:t>12/4/2020</a:t>
             </a:fld>
             <a:endParaRPr lang="en-US" dirty="0"/>
           </a:p>
@@ -1879,7 +1880,7 @@
             <a:fld id="{B61BEF0D-F0BB-DE4B-95CE-6DB70DBA9567}" type="datetimeFigureOut">
               <a:rPr lang="en-US" dirty="0"/>
               <a:pPr/>
-              <a:t>12/1/2020</a:t>
+              <a:t>12/4/2020</a:t>
             </a:fld>
             <a:endParaRPr lang="en-US" dirty="0"/>
           </a:p>
@@ -2154,7 +2155,7 @@
             <a:fld id="{B61BEF0D-F0BB-DE4B-95CE-6DB70DBA9567}" type="datetimeFigureOut">
               <a:rPr lang="en-US" dirty="0"/>
               <a:pPr/>
-              <a:t>12/1/2020</a:t>
+              <a:t>12/4/2020</a:t>
             </a:fld>
             <a:endParaRPr lang="en-US" dirty="0"/>
           </a:p>
@@ -2713,7 +2714,7 @@
             <a:fld id="{B61BEF0D-F0BB-DE4B-95CE-6DB70DBA9567}" type="datetimeFigureOut">
               <a:rPr lang="en-US" dirty="0"/>
               <a:pPr/>
-              <a:t>12/1/2020</a:t>
+              <a:t>12/4/2020</a:t>
             </a:fld>
             <a:endParaRPr lang="en-US" dirty="0"/>
           </a:p>
@@ -3037,7 +3038,7 @@
             <a:fld id="{B61BEF0D-F0BB-DE4B-95CE-6DB70DBA9567}" type="datetimeFigureOut">
               <a:rPr lang="en-US" dirty="0"/>
               <a:pPr/>
-              <a:t>12/1/2020</a:t>
+              <a:t>12/4/2020</a:t>
             </a:fld>
             <a:endParaRPr lang="en-US" dirty="0"/>
           </a:p>
@@ -3239,7 +3240,7 @@
             <a:fld id="{B61BEF0D-F0BB-DE4B-95CE-6DB70DBA9567}" type="datetimeFigureOut">
               <a:rPr lang="en-US" dirty="0"/>
               <a:pPr/>
-              <a:t>12/1/2020</a:t>
+              <a:t>12/4/2020</a:t>
             </a:fld>
             <a:endParaRPr lang="en-US" dirty="0"/>
           </a:p>
@@ -3446,7 +3447,7 @@
             <a:fld id="{B61BEF0D-F0BB-DE4B-95CE-6DB70DBA9567}" type="datetimeFigureOut">
               <a:rPr lang="en-US" dirty="0"/>
               <a:pPr/>
-              <a:t>12/1/2020</a:t>
+              <a:t>12/4/2020</a:t>
             </a:fld>
             <a:endParaRPr lang="en-US" dirty="0"/>
           </a:p>
@@ -3643,7 +3644,7 @@
             <a:fld id="{B61BEF0D-F0BB-DE4B-95CE-6DB70DBA9567}" type="datetimeFigureOut">
               <a:rPr lang="en-US" dirty="0"/>
               <a:pPr/>
-              <a:t>12/1/2020</a:t>
+              <a:t>12/4/2020</a:t>
             </a:fld>
             <a:endParaRPr lang="en-US" dirty="0"/>
           </a:p>
@@ -3916,7 +3917,7 @@
             <a:fld id="{B61BEF0D-F0BB-DE4B-95CE-6DB70DBA9567}" type="datetimeFigureOut">
               <a:rPr lang="en-US" dirty="0"/>
               <a:pPr/>
-              <a:t>12/1/2020</a:t>
+              <a:t>12/4/2020</a:t>
             </a:fld>
             <a:endParaRPr lang="en-US" dirty="0"/>
           </a:p>
@@ -4179,7 +4180,7 @@
             <a:fld id="{B61BEF0D-F0BB-DE4B-95CE-6DB70DBA9567}" type="datetimeFigureOut">
               <a:rPr lang="en-US" dirty="0"/>
               <a:pPr/>
-              <a:t>12/1/2020</a:t>
+              <a:t>12/4/2020</a:t>
             </a:fld>
             <a:endParaRPr lang="en-US" dirty="0"/>
           </a:p>
@@ -4550,7 +4551,7 @@
             <a:fld id="{B61BEF0D-F0BB-DE4B-95CE-6DB70DBA9567}" type="datetimeFigureOut">
               <a:rPr lang="en-US" dirty="0"/>
               <a:pPr/>
-              <a:t>12/1/2020</a:t>
+              <a:t>12/4/2020</a:t>
             </a:fld>
             <a:endParaRPr lang="en-US" dirty="0"/>
           </a:p>
@@ -4695,7 +4696,7 @@
             <a:fld id="{B61BEF0D-F0BB-DE4B-95CE-6DB70DBA9567}" type="datetimeFigureOut">
               <a:rPr lang="en-US" dirty="0"/>
               <a:pPr/>
-              <a:t>12/1/2020</a:t>
+              <a:t>12/4/2020</a:t>
             </a:fld>
             <a:endParaRPr lang="en-US" dirty="0"/>
           </a:p>
@@ -4817,7 +4818,7 @@
             <a:fld id="{B61BEF0D-F0BB-DE4B-95CE-6DB70DBA9567}" type="datetimeFigureOut">
               <a:rPr lang="en-US" dirty="0"/>
               <a:pPr/>
-              <a:t>12/1/2020</a:t>
+              <a:t>12/4/2020</a:t>
             </a:fld>
             <a:endParaRPr lang="en-US" dirty="0"/>
           </a:p>
@@ -5099,7 +5100,7 @@
             <a:fld id="{B61BEF0D-F0BB-DE4B-95CE-6DB70DBA9567}" type="datetimeFigureOut">
               <a:rPr lang="en-US" dirty="0"/>
               <a:pPr/>
-              <a:t>12/1/2020</a:t>
+              <a:t>12/4/2020</a:t>
             </a:fld>
             <a:endParaRPr lang="en-US" dirty="0"/>
           </a:p>
@@ -5420,7 +5421,7 @@
             <a:fld id="{B61BEF0D-F0BB-DE4B-95CE-6DB70DBA9567}" type="datetimeFigureOut">
               <a:rPr lang="en-US" dirty="0"/>
               <a:pPr/>
-              <a:t>12/1/2020</a:t>
+              <a:t>12/4/2020</a:t>
             </a:fld>
             <a:endParaRPr lang="en-US" dirty="0"/>
           </a:p>
@@ -5631,7 +5632,7 @@
             <a:fld id="{B61BEF0D-F0BB-DE4B-95CE-6DB70DBA9567}" type="datetimeFigureOut">
               <a:rPr lang="en-US" dirty="0"/>
               <a:pPr/>
-              <a:t>12/1/2020</a:t>
+              <a:t>12/4/2020</a:t>
             </a:fld>
             <a:endParaRPr lang="en-US" dirty="0"/>
           </a:p>
@@ -8473,6 +8474,74 @@
 </p:sld>
 </file>
 
+<file path=ppt/slides/slide9.xml><?xml version="1.0" encoding="utf-8"?>
+<p:sld xmlns:a="http://schemas.openxmlformats.org/drawingml/2006/main" xmlns:r="http://schemas.openxmlformats.org/officeDocument/2006/relationships" xmlns:p="http://schemas.openxmlformats.org/presentationml/2006/main">
+  <p:cSld>
+    <p:spTree>
+      <p:nvGrpSpPr>
+        <p:cNvPr id="1" name=""/>
+        <p:cNvGrpSpPr/>
+        <p:nvPr/>
+      </p:nvGrpSpPr>
+      <p:grpSpPr>
+        <a:xfrm>
+          <a:off x="0" y="0"/>
+          <a:ext cx="0" cy="0"/>
+          <a:chOff x="0" y="0"/>
+          <a:chExt cx="0" cy="0"/>
+        </a:xfrm>
+      </p:grpSpPr>
+      <p:sp>
+        <p:nvSpPr>
+          <p:cNvPr id="2" name="Título 1">
+            <a:extLst>
+              <a:ext uri="{FF2B5EF4-FFF2-40B4-BE49-F238E27FC236}">
+                <a16:creationId xmlns:a16="http://schemas.microsoft.com/office/drawing/2014/main" id="{6DEEBE21-39C2-454B-993C-B31B6E118D8A}"/>
+              </a:ext>
+            </a:extLst>
+          </p:cNvPr>
+          <p:cNvSpPr>
+            <a:spLocks noGrp="1"/>
+          </p:cNvSpPr>
+          <p:nvPr>
+            <p:ph type="title"/>
+          </p:nvPr>
+        </p:nvSpPr>
+        <p:spPr>
+          <a:xfrm>
+            <a:off x="1030287" y="1775281"/>
+            <a:ext cx="10131425" cy="3307438"/>
+          </a:xfrm>
+        </p:spPr>
+        <p:txBody>
+          <a:bodyPr>
+            <a:normAutofit/>
+          </a:bodyPr>
+          <a:lstStyle/>
+          <a:p>
+            <a:pPr algn="ctr"/>
+            <a:r>
+              <a:rPr lang="es-ES" sz="8800" dirty="0">
+                <a:latin typeface="Rockwell Extra Bold" panose="02060903040505020403" pitchFamily="18" charset="0"/>
+              </a:rPr>
+              <a:t>FIN</a:t>
+            </a:r>
+          </a:p>
+        </p:txBody>
+      </p:sp>
+    </p:spTree>
+    <p:extLst>
+      <p:ext uri="{BB962C8B-B14F-4D97-AF65-F5344CB8AC3E}">
+        <p14:creationId xmlns:p14="http://schemas.microsoft.com/office/powerpoint/2010/main" val="3292695591"/>
+      </p:ext>
+    </p:extLst>
+  </p:cSld>
+  <p:clrMapOvr>
+    <a:masterClrMapping/>
+  </p:clrMapOvr>
+</p:sld>
+</file>
+
 <file path=ppt/theme/theme1.xml><?xml version="1.0" encoding="utf-8"?>
 <a:theme xmlns:a="http://schemas.openxmlformats.org/drawingml/2006/main" name="Celestial">
   <a:themeElements>

</xml_diff>